<commit_message>
Tweaked Session 5 slides, added SQL exercises for Session 6.
</commit_message>
<xml_diff>
--- a/slides/session05.pptx
+++ b/slides/session05.pptx
@@ -3322,21 +3322,13 @@
           <a:p>
             <a:r>
               <a:rPr lang="en-US" dirty="0" smtClean="0"/>
-              <a:t>It’s </a:t>
-            </a:r>
+              <a:t>It’s just a collection of properties!</a:t>
+            </a:r>
+          </a:p>
+          <a:p>
             <a:r>
               <a:rPr lang="en-US" dirty="0" smtClean="0"/>
-              <a:t>just a collection of properties!</a:t>
-            </a:r>
-          </a:p>
-          <a:p>
-            <a:r>
-              <a:rPr lang="en-US" dirty="0" smtClean="0"/>
-              <a:t>Objects can have functions </a:t>
-            </a:r>
-            <a:r>
-              <a:rPr lang="en-US" dirty="0" smtClean="0"/>
-              <a:t>also! (called methods)</a:t>
+              <a:t>Objects can have functions also! (called methods)</a:t>
             </a:r>
             <a:endParaRPr lang="en-US" dirty="0"/>
           </a:p>
@@ -3899,13 +3891,8 @@
           <a:p>
             <a:r>
               <a:rPr lang="en-US" dirty="0" smtClean="0"/>
-              <a:t>Invoke an object’s method using the dot </a:t>
-            </a:r>
-            <a:r>
-              <a:rPr lang="en-US" dirty="0" smtClean="0"/>
-              <a:t>notation: </a:t>
-            </a:r>
-            <a:endParaRPr lang="en-US" dirty="0" smtClean="0"/>
+              <a:t>Invoke an object’s method using the dot notation: </a:t>
+            </a:r>
           </a:p>
           <a:p>
             <a:endParaRPr lang="en-US" dirty="0"/>
@@ -3925,11 +3912,7 @@
           <a:p>
             <a:r>
               <a:rPr lang="en-US" dirty="0" smtClean="0"/>
-              <a:t>What’s </a:t>
-            </a:r>
-            <a:r>
-              <a:rPr lang="en-US" dirty="0" smtClean="0"/>
-              <a:t>“this”?</a:t>
+              <a:t>What’s “this”?</a:t>
             </a:r>
             <a:endParaRPr lang="en-US" dirty="0"/>
           </a:p>
@@ -4210,13 +4193,8 @@
           <a:p>
             <a:r>
               <a:rPr lang="en-US" dirty="0" smtClean="0"/>
-              <a:t>Why </a:t>
-            </a:r>
-            <a:r>
-              <a:rPr lang="en-US" dirty="0" smtClean="0"/>
-              <a:t>have methods? What’s the advantage of functions directly to objects?</a:t>
-            </a:r>
-            <a:endParaRPr lang="en-US" dirty="0" smtClean="0"/>
+              <a:t>Why have methods? What’s the advantage of functions directly to objects?</a:t>
+            </a:r>
           </a:p>
         </p:txBody>
       </p:sp>
@@ -6667,7 +6645,15 @@
                   <a:srgbClr val="000000"/>
                 </a:solidFill>
               </a:rPr>
-              <a:t>Source: </a:t>
+              <a:t>Source: Flickr http://</a:t>
+            </a:r>
+            <a:r>
+              <a:rPr lang="en-US" sz="1000" b="0" dirty="0" err="1">
+                <a:solidFill>
+                  <a:srgbClr val="000000"/>
+                </a:solidFill>
+              </a:rPr>
+              <a:t>www.flickr.com</a:t>
             </a:r>
             <a:r>
               <a:rPr lang="en-US" sz="1000" b="0" dirty="0">
@@ -6675,7 +6661,7 @@
                   <a:srgbClr val="000000"/>
                 </a:solidFill>
               </a:rPr>
-              <a:t>Flickr http://</a:t>
+              <a:t>/photos/</a:t>
             </a:r>
             <a:r>
               <a:rPr lang="en-US" sz="1000" b="0" dirty="0" err="1">
@@ -6683,7 +6669,7 @@
                   <a:srgbClr val="000000"/>
                 </a:solidFill>
               </a:rPr>
-              <a:t>www.flickr.com</a:t>
+              <a:t>kitchenplan</a:t>
             </a:r>
             <a:r>
               <a:rPr lang="en-US" sz="1000" b="0" dirty="0">
@@ -6691,29 +6677,8 @@
                   <a:srgbClr val="000000"/>
                 </a:solidFill>
               </a:rPr>
-              <a:t>/photos/</a:t>
-            </a:r>
-            <a:r>
-              <a:rPr lang="en-US" sz="1000" b="0" dirty="0" err="1">
-                <a:solidFill>
-                  <a:srgbClr val="000000"/>
-                </a:solidFill>
-              </a:rPr>
-              <a:t>kitchenplan</a:t>
-            </a:r>
-            <a:r>
-              <a:rPr lang="en-US" sz="1000" b="0" dirty="0">
-                <a:solidFill>
-                  <a:srgbClr val="000000"/>
-                </a:solidFill>
-              </a:rPr>
               <a:t>/6258898113/</a:t>
             </a:r>
-            <a:endParaRPr lang="en-US" sz="1000" b="0" dirty="0">
-              <a:solidFill>
-                <a:srgbClr val="000000"/>
-              </a:solidFill>
-            </a:endParaRPr>
           </a:p>
         </p:txBody>
       </p:sp>
@@ -8485,11 +8450,7 @@
           <a:p>
             <a:r>
               <a:rPr lang="en-US" dirty="0" smtClean="0"/>
-              <a:t>Linear vs. </a:t>
-            </a:r>
-            <a:r>
-              <a:rPr lang="en-US" dirty="0" smtClean="0"/>
-              <a:t>logarithmic algorithms</a:t>
+              <a:t>Linear vs. logarithmic algorithms</a:t>
             </a:r>
           </a:p>
           <a:p>
@@ -10349,451 +10310,282 @@
       </p:cxnSp>
       <p:sp>
         <p:nvSpPr>
-          <p:cNvPr id="29702" name="Oval 8"/>
-          <p:cNvSpPr>
+          <p:cNvPr id="29706" name="Text Box 6"/>
+          <p:cNvSpPr txBox="1">
             <a:spLocks noChangeArrowheads="1"/>
           </p:cNvSpPr>
           <p:nvPr/>
         </p:nvSpPr>
         <p:spPr bwMode="auto">
           <a:xfrm>
-            <a:off x="4625975" y="3170237"/>
-            <a:ext cx="76200" cy="76200"/>
+            <a:off x="4092575" y="4678362"/>
+            <a:ext cx="3908425" cy="1570038"/>
           </a:xfrm>
-          <a:prstGeom prst="ellipse">
+          <a:prstGeom prst="rect">
             <a:avLst/>
           </a:prstGeom>
           <a:noFill/>
-          <a:ln w="9525">
-            <a:solidFill>
-              <a:schemeClr val="bg1"/>
-            </a:solidFill>
-            <a:round/>
-            <a:headEnd/>
-            <a:tailEnd/>
+          <a:ln>
+            <a:noFill/>
           </a:ln>
+          <a:extLst>
+            <a:ext uri="{909E8E84-426E-40dd-AFC4-6F175D3DCCD1}">
+              <a14:hiddenFill xmlns:a14="http://schemas.microsoft.com/office/drawing/2010/main">
+                <a:solidFill>
+                  <a:srgbClr val="FFFFFF"/>
+                </a:solidFill>
+              </a14:hiddenFill>
+            </a:ext>
+            <a:ext uri="{91240B29-F687-4f45-9708-019B960494DF}">
+              <a14:hiddenLine xmlns:a14="http://schemas.microsoft.com/office/drawing/2010/main" w="9525">
+                <a:solidFill>
+                  <a:srgbClr val="000000"/>
+                </a:solidFill>
+                <a:miter lim="800000"/>
+                <a:headEnd/>
+                <a:tailEnd/>
+              </a14:hiddenLine>
+            </a:ext>
+          </a:extLst>
         </p:spPr>
         <p:txBody>
-          <a:bodyPr wrap="none" anchor="ctr"/>
-          <a:lstStyle/>
-          <a:p>
-            <a:endParaRPr lang="en-US"/>
-          </a:p>
-        </p:txBody>
-      </p:sp>
-      <p:grpSp>
-        <p:nvGrpSpPr>
-          <p:cNvPr id="29703" name="Group 13"/>
-          <p:cNvGrpSpPr>
-            <a:grpSpLocks/>
-          </p:cNvGrpSpPr>
-          <p:nvPr/>
-        </p:nvGrpSpPr>
-        <p:grpSpPr bwMode="auto">
-          <a:xfrm>
-            <a:off x="4092575" y="4678362"/>
-            <a:ext cx="3908425" cy="1570038"/>
-            <a:chOff x="3360" y="1920"/>
-            <a:chExt cx="2462" cy="989"/>
-          </a:xfrm>
-        </p:grpSpPr>
-        <p:sp>
-          <p:nvSpPr>
-            <p:cNvPr id="29706" name="Text Box 6"/>
-            <p:cNvSpPr txBox="1">
-              <a:spLocks noChangeArrowheads="1"/>
-            </p:cNvSpPr>
-            <p:nvPr/>
-          </p:nvSpPr>
-          <p:spPr bwMode="auto">
-            <a:xfrm>
-              <a:off x="3360" y="1920"/>
-              <a:ext cx="2462" cy="989"/>
-            </a:xfrm>
-            <a:prstGeom prst="rect">
-              <a:avLst/>
-            </a:prstGeom>
-            <a:noFill/>
-            <a:ln>
-              <a:noFill/>
-            </a:ln>
-            <a:extLst>
-              <a:ext uri="{909E8E84-426E-40dd-AFC4-6F175D3DCCD1}">
-                <a14:hiddenFill xmlns:a14="http://schemas.microsoft.com/office/drawing/2010/main">
-                  <a:solidFill>
-                    <a:srgbClr val="FFFFFF"/>
-                  </a:solidFill>
-                </a14:hiddenFill>
-              </a:ext>
-              <a:ext uri="{91240B29-F687-4f45-9708-019B960494DF}">
-                <a14:hiddenLine xmlns:a14="http://schemas.microsoft.com/office/drawing/2010/main" w="9525">
-                  <a:solidFill>
-                    <a:srgbClr val="000000"/>
-                  </a:solidFill>
-                  <a:miter lim="800000"/>
-                  <a:headEnd/>
-                  <a:tailEnd/>
-                </a14:hiddenLine>
-              </a:ext>
-            </a:extLst>
-          </p:spPr>
-          <p:txBody>
-            <a:bodyPr wrap="none">
-              <a:spAutoFit/>
-            </a:bodyPr>
-            <a:lstStyle>
-              <a:lvl1pPr>
-                <a:defRPr sz="1600" b="1">
-                  <a:solidFill>
-                    <a:schemeClr val="tx1"/>
-                  </a:solidFill>
-                  <a:latin typeface="Arial" charset="0"/>
-                  <a:ea typeface="ＭＳ Ｐゴシック" charset="0"/>
-                </a:defRPr>
-              </a:lvl1pPr>
-              <a:lvl2pPr marL="742950" indent="-285750">
-                <a:defRPr sz="1600" b="1">
-                  <a:solidFill>
-                    <a:schemeClr val="tx1"/>
-                  </a:solidFill>
-                  <a:latin typeface="Arial" charset="0"/>
-                  <a:ea typeface="ＭＳ Ｐゴシック" charset="0"/>
-                </a:defRPr>
-              </a:lvl2pPr>
-              <a:lvl3pPr marL="1143000" indent="-228600">
-                <a:defRPr sz="1600" b="1">
-                  <a:solidFill>
-                    <a:schemeClr val="tx1"/>
-                  </a:solidFill>
-                  <a:latin typeface="Arial" charset="0"/>
-                  <a:ea typeface="ＭＳ Ｐゴシック" charset="0"/>
-                </a:defRPr>
-              </a:lvl3pPr>
-              <a:lvl4pPr marL="1600200" indent="-228600">
-                <a:defRPr sz="1600" b="1">
-                  <a:solidFill>
-                    <a:schemeClr val="tx1"/>
-                  </a:solidFill>
-                  <a:latin typeface="Arial" charset="0"/>
-                  <a:ea typeface="ＭＳ Ｐゴシック" charset="0"/>
-                </a:defRPr>
-              </a:lvl4pPr>
-              <a:lvl5pPr marL="2057400" indent="-228600">
-                <a:defRPr sz="1600" b="1">
-                  <a:solidFill>
-                    <a:schemeClr val="tx1"/>
-                  </a:solidFill>
-                  <a:latin typeface="Arial" charset="0"/>
-                  <a:ea typeface="ＭＳ Ｐゴシック" charset="0"/>
-                </a:defRPr>
-              </a:lvl5pPr>
-              <a:lvl6pPr marL="2514600" indent="-228600" eaLnBrk="0" fontAlgn="base" hangingPunct="0">
-                <a:spcBef>
-                  <a:spcPct val="0"/>
-                </a:spcBef>
-                <a:spcAft>
-                  <a:spcPct val="0"/>
-                </a:spcAft>
-                <a:defRPr sz="1600" b="1">
-                  <a:solidFill>
-                    <a:schemeClr val="tx1"/>
-                  </a:solidFill>
-                  <a:latin typeface="Arial" charset="0"/>
-                  <a:ea typeface="ＭＳ Ｐゴシック" charset="0"/>
-                </a:defRPr>
-              </a:lvl6pPr>
-              <a:lvl7pPr marL="2971800" indent="-228600" eaLnBrk="0" fontAlgn="base" hangingPunct="0">
-                <a:spcBef>
-                  <a:spcPct val="0"/>
-                </a:spcBef>
-                <a:spcAft>
-                  <a:spcPct val="0"/>
-                </a:spcAft>
-                <a:defRPr sz="1600" b="1">
-                  <a:solidFill>
-                    <a:schemeClr val="tx1"/>
-                  </a:solidFill>
-                  <a:latin typeface="Arial" charset="0"/>
-                  <a:ea typeface="ＭＳ Ｐゴシック" charset="0"/>
-                </a:defRPr>
-              </a:lvl7pPr>
-              <a:lvl8pPr marL="3429000" indent="-228600" eaLnBrk="0" fontAlgn="base" hangingPunct="0">
-                <a:spcBef>
-                  <a:spcPct val="0"/>
-                </a:spcBef>
-                <a:spcAft>
-                  <a:spcPct val="0"/>
-                </a:spcAft>
-                <a:defRPr sz="1600" b="1">
-                  <a:solidFill>
-                    <a:schemeClr val="tx1"/>
-                  </a:solidFill>
-                  <a:latin typeface="Arial" charset="0"/>
-                  <a:ea typeface="ＭＳ Ｐゴシック" charset="0"/>
-                </a:defRPr>
-              </a:lvl8pPr>
-              <a:lvl9pPr marL="3886200" indent="-228600" eaLnBrk="0" fontAlgn="base" hangingPunct="0">
-                <a:spcBef>
-                  <a:spcPct val="0"/>
-                </a:spcBef>
-                <a:spcAft>
-                  <a:spcPct val="0"/>
-                </a:spcAft>
-                <a:defRPr sz="1600" b="1">
-                  <a:solidFill>
-                    <a:schemeClr val="tx1"/>
-                  </a:solidFill>
-                  <a:latin typeface="Arial" charset="0"/>
-                  <a:ea typeface="ＭＳ Ｐゴシック" charset="0"/>
-                </a:defRPr>
-              </a:lvl9pPr>
-            </a:lstStyle>
-            <a:p>
-              <a:r>
-                <a:rPr lang="en-US" sz="2400" b="0" dirty="0">
-                  <a:solidFill>
-                    <a:srgbClr val="000000"/>
-                  </a:solidFill>
-                  <a:latin typeface="Gill Sans"/>
-                  <a:cs typeface="Gill Sans"/>
-                </a:rPr>
-                <a:t>function </a:t>
-              </a:r>
-              <a:r>
-                <a:rPr lang="en-US" sz="2400" b="0" dirty="0" err="1">
-                  <a:solidFill>
-                    <a:srgbClr val="000000"/>
-                  </a:solidFill>
-                  <a:latin typeface="Gill Sans"/>
-                  <a:cs typeface="Gill Sans"/>
-                </a:rPr>
-                <a:t>convertToCelsius</a:t>
-              </a:r>
-              <a:r>
-                <a:rPr lang="en-US" sz="2400" b="0" dirty="0">
-                  <a:solidFill>
-                    <a:srgbClr val="000000"/>
-                  </a:solidFill>
-                  <a:latin typeface="Gill Sans"/>
-                  <a:cs typeface="Gill Sans"/>
-                </a:rPr>
-                <a:t>(f) {</a:t>
-              </a:r>
-            </a:p>
-            <a:p>
-              <a:r>
-                <a:rPr lang="en-US" sz="2400" b="0" dirty="0">
-                  <a:solidFill>
-                    <a:srgbClr val="000000"/>
-                  </a:solidFill>
-                  <a:latin typeface="Gill Sans"/>
-                  <a:cs typeface="Gill Sans"/>
-                </a:rPr>
-                <a:t>    </a:t>
-              </a:r>
-              <a:r>
-                <a:rPr lang="en-US" sz="2400" b="0" dirty="0" err="1">
-                  <a:solidFill>
-                    <a:srgbClr val="000000"/>
-                  </a:solidFill>
-                  <a:latin typeface="Gill Sans"/>
-                  <a:cs typeface="Gill Sans"/>
-                </a:rPr>
-                <a:t>var</a:t>
-              </a:r>
-              <a:r>
-                <a:rPr lang="en-US" sz="2400" b="0" dirty="0">
-                  <a:solidFill>
-                    <a:srgbClr val="000000"/>
-                  </a:solidFill>
-                  <a:latin typeface="Gill Sans"/>
-                  <a:cs typeface="Gill Sans"/>
-                </a:rPr>
-                <a:t> </a:t>
-              </a:r>
-              <a:r>
-                <a:rPr lang="en-US" sz="2400" b="0" dirty="0" err="1">
-                  <a:solidFill>
-                    <a:srgbClr val="000000"/>
-                  </a:solidFill>
-                  <a:latin typeface="Gill Sans"/>
-                  <a:cs typeface="Gill Sans"/>
-                </a:rPr>
-                <a:t>celsius</a:t>
-              </a:r>
-              <a:r>
-                <a:rPr lang="en-US" sz="2400" b="0" dirty="0">
-                  <a:solidFill>
-                    <a:srgbClr val="000000"/>
-                  </a:solidFill>
-                  <a:latin typeface="Gill Sans"/>
-                  <a:cs typeface="Gill Sans"/>
-                </a:rPr>
-                <a:t> = 5/9 * (f-32);</a:t>
-              </a:r>
-            </a:p>
-            <a:p>
-              <a:r>
-                <a:rPr lang="en-US" sz="2400" b="0" dirty="0">
-                  <a:solidFill>
-                    <a:srgbClr val="000000"/>
-                  </a:solidFill>
-                  <a:latin typeface="Gill Sans"/>
-                  <a:cs typeface="Gill Sans"/>
-                </a:rPr>
-                <a:t>    return </a:t>
-              </a:r>
-              <a:r>
-                <a:rPr lang="en-US" sz="2400" b="0" dirty="0" err="1">
-                  <a:solidFill>
-                    <a:srgbClr val="000000"/>
-                  </a:solidFill>
-                  <a:latin typeface="Gill Sans"/>
-                  <a:cs typeface="Gill Sans"/>
-                </a:rPr>
-                <a:t>celsius</a:t>
-              </a:r>
-              <a:r>
-                <a:rPr lang="en-US" sz="2400" b="0" dirty="0">
-                  <a:solidFill>
-                    <a:srgbClr val="000000"/>
-                  </a:solidFill>
-                  <a:latin typeface="Gill Sans"/>
-                  <a:cs typeface="Gill Sans"/>
-                </a:rPr>
-                <a:t>;</a:t>
-              </a:r>
-            </a:p>
-            <a:p>
-              <a:r>
-                <a:rPr lang="en-US" sz="2400" b="0" dirty="0">
-                  <a:solidFill>
-                    <a:srgbClr val="000000"/>
-                  </a:solidFill>
-                  <a:latin typeface="Gill Sans"/>
-                  <a:cs typeface="Gill Sans"/>
-                </a:rPr>
-                <a:t>} </a:t>
-              </a:r>
-            </a:p>
-          </p:txBody>
-        </p:sp>
-        <p:sp>
-          <p:nvSpPr>
-            <p:cNvPr id="29707" name="Oval 9"/>
-            <p:cNvSpPr>
-              <a:spLocks noChangeArrowheads="1"/>
-            </p:cNvSpPr>
-            <p:nvPr/>
-          </p:nvSpPr>
-          <p:spPr bwMode="auto">
-            <a:xfrm>
-              <a:off x="5660" y="1920"/>
-              <a:ext cx="48" cy="48"/>
-            </a:xfrm>
-            <a:prstGeom prst="ellipse">
-              <a:avLst/>
-            </a:prstGeom>
-            <a:solidFill>
-              <a:schemeClr val="accent1"/>
-            </a:solidFill>
-            <a:ln w="9525">
-              <a:solidFill>
-                <a:schemeClr val="tx1"/>
-              </a:solidFill>
-              <a:round/>
-              <a:headEnd/>
-              <a:tailEnd/>
-            </a:ln>
-          </p:spPr>
-          <p:txBody>
-            <a:bodyPr wrap="none" anchor="ctr"/>
-            <a:lstStyle/>
-            <a:p>
-              <a:endParaRPr lang="en-US">
+          <a:bodyPr wrap="none">
+            <a:spAutoFit/>
+          </a:bodyPr>
+          <a:lstStyle>
+            <a:lvl1pPr>
+              <a:defRPr sz="1600" b="1">
+                <a:solidFill>
+                  <a:schemeClr val="tx1"/>
+                </a:solidFill>
+                <a:latin typeface="Arial" charset="0"/>
+                <a:ea typeface="ＭＳ Ｐゴシック" charset="0"/>
+              </a:defRPr>
+            </a:lvl1pPr>
+            <a:lvl2pPr marL="742950" indent="-285750">
+              <a:defRPr sz="1600" b="1">
+                <a:solidFill>
+                  <a:schemeClr val="tx1"/>
+                </a:solidFill>
+                <a:latin typeface="Arial" charset="0"/>
+                <a:ea typeface="ＭＳ Ｐゴシック" charset="0"/>
+              </a:defRPr>
+            </a:lvl2pPr>
+            <a:lvl3pPr marL="1143000" indent="-228600">
+              <a:defRPr sz="1600" b="1">
+                <a:solidFill>
+                  <a:schemeClr val="tx1"/>
+                </a:solidFill>
+                <a:latin typeface="Arial" charset="0"/>
+                <a:ea typeface="ＭＳ Ｐゴシック" charset="0"/>
+              </a:defRPr>
+            </a:lvl3pPr>
+            <a:lvl4pPr marL="1600200" indent="-228600">
+              <a:defRPr sz="1600" b="1">
+                <a:solidFill>
+                  <a:schemeClr val="tx1"/>
+                </a:solidFill>
+                <a:latin typeface="Arial" charset="0"/>
+                <a:ea typeface="ＭＳ Ｐゴシック" charset="0"/>
+              </a:defRPr>
+            </a:lvl4pPr>
+            <a:lvl5pPr marL="2057400" indent="-228600">
+              <a:defRPr sz="1600" b="1">
+                <a:solidFill>
+                  <a:schemeClr val="tx1"/>
+                </a:solidFill>
+                <a:latin typeface="Arial" charset="0"/>
+                <a:ea typeface="ＭＳ Ｐゴシック" charset="0"/>
+              </a:defRPr>
+            </a:lvl5pPr>
+            <a:lvl6pPr marL="2514600" indent="-228600" eaLnBrk="0" fontAlgn="base" hangingPunct="0">
+              <a:spcBef>
+                <a:spcPct val="0"/>
+              </a:spcBef>
+              <a:spcAft>
+                <a:spcPct val="0"/>
+              </a:spcAft>
+              <a:defRPr sz="1600" b="1">
+                <a:solidFill>
+                  <a:schemeClr val="tx1"/>
+                </a:solidFill>
+                <a:latin typeface="Arial" charset="0"/>
+                <a:ea typeface="ＭＳ Ｐゴシック" charset="0"/>
+              </a:defRPr>
+            </a:lvl6pPr>
+            <a:lvl7pPr marL="2971800" indent="-228600" eaLnBrk="0" fontAlgn="base" hangingPunct="0">
+              <a:spcBef>
+                <a:spcPct val="0"/>
+              </a:spcBef>
+              <a:spcAft>
+                <a:spcPct val="0"/>
+              </a:spcAft>
+              <a:defRPr sz="1600" b="1">
+                <a:solidFill>
+                  <a:schemeClr val="tx1"/>
+                </a:solidFill>
+                <a:latin typeface="Arial" charset="0"/>
+                <a:ea typeface="ＭＳ Ｐゴシック" charset="0"/>
+              </a:defRPr>
+            </a:lvl7pPr>
+            <a:lvl8pPr marL="3429000" indent="-228600" eaLnBrk="0" fontAlgn="base" hangingPunct="0">
+              <a:spcBef>
+                <a:spcPct val="0"/>
+              </a:spcBef>
+              <a:spcAft>
+                <a:spcPct val="0"/>
+              </a:spcAft>
+              <a:defRPr sz="1600" b="1">
+                <a:solidFill>
+                  <a:schemeClr val="tx1"/>
+                </a:solidFill>
+                <a:latin typeface="Arial" charset="0"/>
+                <a:ea typeface="ＭＳ Ｐゴシック" charset="0"/>
+              </a:defRPr>
+            </a:lvl8pPr>
+            <a:lvl9pPr marL="3886200" indent="-228600" eaLnBrk="0" fontAlgn="base" hangingPunct="0">
+              <a:spcBef>
+                <a:spcPct val="0"/>
+              </a:spcBef>
+              <a:spcAft>
+                <a:spcPct val="0"/>
+              </a:spcAft>
+              <a:defRPr sz="1600" b="1">
+                <a:solidFill>
+                  <a:schemeClr val="tx1"/>
+                </a:solidFill>
+                <a:latin typeface="Arial" charset="0"/>
+                <a:ea typeface="ＭＳ Ｐゴシック" charset="0"/>
+              </a:defRPr>
+            </a:lvl9pPr>
+          </a:lstStyle>
+          <a:p>
+            <a:r>
+              <a:rPr lang="en-US" sz="2400" b="0" dirty="0">
                 <a:solidFill>
                   <a:srgbClr val="000000"/>
                 </a:solidFill>
                 <a:latin typeface="Gill Sans"/>
                 <a:cs typeface="Gill Sans"/>
-              </a:endParaRPr>
-            </a:p>
-          </p:txBody>
-        </p:sp>
-        <p:sp>
-          <p:nvSpPr>
-            <p:cNvPr id="29708" name="Oval 10"/>
-            <p:cNvSpPr>
-              <a:spLocks noChangeArrowheads="1"/>
-            </p:cNvSpPr>
-            <p:nvPr/>
-          </p:nvSpPr>
-          <p:spPr bwMode="auto">
-            <a:xfrm>
-              <a:off x="4412" y="2650"/>
-              <a:ext cx="48" cy="48"/>
-            </a:xfrm>
-            <a:prstGeom prst="ellipse">
-              <a:avLst/>
-            </a:prstGeom>
-            <a:solidFill>
-              <a:schemeClr val="accent1"/>
-            </a:solidFill>
-            <a:ln w="9525">
-              <a:solidFill>
-                <a:schemeClr val="tx1"/>
-              </a:solidFill>
-              <a:round/>
-              <a:headEnd/>
-              <a:tailEnd/>
-            </a:ln>
-          </p:spPr>
-          <p:txBody>
-            <a:bodyPr wrap="none" anchor="ctr"/>
-            <a:lstStyle/>
-            <a:p>
-              <a:endParaRPr lang="en-US">
+              </a:rPr>
+              <a:t>function </a:t>
+            </a:r>
+            <a:r>
+              <a:rPr lang="en-US" sz="2400" b="0" dirty="0" err="1">
                 <a:solidFill>
                   <a:srgbClr val="000000"/>
                 </a:solidFill>
                 <a:latin typeface="Gill Sans"/>
                 <a:cs typeface="Gill Sans"/>
-              </a:endParaRPr>
-            </a:p>
-          </p:txBody>
-        </p:sp>
-      </p:grpSp>
-      <p:sp>
-        <p:nvSpPr>
-          <p:cNvPr id="29704" name="Oval 11"/>
-          <p:cNvSpPr>
-            <a:spLocks noChangeArrowheads="1"/>
-          </p:cNvSpPr>
-          <p:nvPr/>
-        </p:nvSpPr>
-        <p:spPr bwMode="auto">
-          <a:xfrm>
-            <a:off x="1654175" y="3170237"/>
-            <a:ext cx="76200" cy="76200"/>
-          </a:xfrm>
-          <a:prstGeom prst="ellipse">
-            <a:avLst/>
-          </a:prstGeom>
-          <a:noFill/>
-          <a:ln w="9525">
-            <a:solidFill>
-              <a:schemeClr val="bg1"/>
-            </a:solidFill>
-            <a:round/>
-            <a:headEnd/>
-            <a:tailEnd/>
-          </a:ln>
-        </p:spPr>
-        <p:txBody>
-          <a:bodyPr wrap="none" anchor="ctr"/>
-          <a:lstStyle/>
-          <a:p>
-            <a:endParaRPr lang="en-US"/>
+              </a:rPr>
+              <a:t>convertToCelsius</a:t>
+            </a:r>
+            <a:r>
+              <a:rPr lang="en-US" sz="2400" b="0" dirty="0">
+                <a:solidFill>
+                  <a:srgbClr val="000000"/>
+                </a:solidFill>
+                <a:latin typeface="Gill Sans"/>
+                <a:cs typeface="Gill Sans"/>
+              </a:rPr>
+              <a:t>(f) {</a:t>
+            </a:r>
+          </a:p>
+          <a:p>
+            <a:r>
+              <a:rPr lang="en-US" sz="2400" b="0" dirty="0">
+                <a:solidFill>
+                  <a:srgbClr val="000000"/>
+                </a:solidFill>
+                <a:latin typeface="Gill Sans"/>
+                <a:cs typeface="Gill Sans"/>
+              </a:rPr>
+              <a:t>    </a:t>
+            </a:r>
+            <a:r>
+              <a:rPr lang="en-US" sz="2400" b="0" dirty="0" err="1">
+                <a:solidFill>
+                  <a:srgbClr val="000000"/>
+                </a:solidFill>
+                <a:latin typeface="Gill Sans"/>
+                <a:cs typeface="Gill Sans"/>
+              </a:rPr>
+              <a:t>var</a:t>
+            </a:r>
+            <a:r>
+              <a:rPr lang="en-US" sz="2400" b="0" dirty="0">
+                <a:solidFill>
+                  <a:srgbClr val="000000"/>
+                </a:solidFill>
+                <a:latin typeface="Gill Sans"/>
+                <a:cs typeface="Gill Sans"/>
+              </a:rPr>
+              <a:t> </a:t>
+            </a:r>
+            <a:r>
+              <a:rPr lang="en-US" sz="2400" b="0" dirty="0" err="1">
+                <a:solidFill>
+                  <a:srgbClr val="000000"/>
+                </a:solidFill>
+                <a:latin typeface="Gill Sans"/>
+                <a:cs typeface="Gill Sans"/>
+              </a:rPr>
+              <a:t>celsius</a:t>
+            </a:r>
+            <a:r>
+              <a:rPr lang="en-US" sz="2400" b="0" dirty="0">
+                <a:solidFill>
+                  <a:srgbClr val="000000"/>
+                </a:solidFill>
+                <a:latin typeface="Gill Sans"/>
+                <a:cs typeface="Gill Sans"/>
+              </a:rPr>
+              <a:t> = 5/9 * (f-32);</a:t>
+            </a:r>
+          </a:p>
+          <a:p>
+            <a:r>
+              <a:rPr lang="en-US" sz="2400" b="0" dirty="0">
+                <a:solidFill>
+                  <a:srgbClr val="000000"/>
+                </a:solidFill>
+                <a:latin typeface="Gill Sans"/>
+                <a:cs typeface="Gill Sans"/>
+              </a:rPr>
+              <a:t>    return </a:t>
+            </a:r>
+            <a:r>
+              <a:rPr lang="en-US" sz="2400" b="0" dirty="0" err="1">
+                <a:solidFill>
+                  <a:srgbClr val="000000"/>
+                </a:solidFill>
+                <a:latin typeface="Gill Sans"/>
+                <a:cs typeface="Gill Sans"/>
+              </a:rPr>
+              <a:t>celsius</a:t>
+            </a:r>
+            <a:r>
+              <a:rPr lang="en-US" sz="2400" b="0" dirty="0">
+                <a:solidFill>
+                  <a:srgbClr val="000000"/>
+                </a:solidFill>
+                <a:latin typeface="Gill Sans"/>
+                <a:cs typeface="Gill Sans"/>
+              </a:rPr>
+              <a:t>;</a:t>
+            </a:r>
+          </a:p>
+          <a:p>
+            <a:r>
+              <a:rPr lang="en-US" sz="2400" b="0" dirty="0">
+                <a:solidFill>
+                  <a:srgbClr val="000000"/>
+                </a:solidFill>
+                <a:latin typeface="Gill Sans"/>
+                <a:cs typeface="Gill Sans"/>
+              </a:rPr>
+              <a:t>} </a:t>
+            </a:r>
           </a:p>
         </p:txBody>
       </p:sp>
@@ -10802,7 +10594,6 @@
           <p:cNvPr id="29705" name="AutoShape 12"/>
           <p:cNvCxnSpPr>
             <a:cxnSpLocks noChangeShapeType="1"/>
-            <a:endCxn id="29704" idx="4"/>
           </p:cNvCxnSpPr>
           <p:nvPr/>
         </p:nvCxnSpPr>

</xml_diff>

<commit_message>
Tweaked session 5 slides.
</commit_message>
<xml_diff>
--- a/slides/session05.pptx
+++ b/slides/session05.pptx
@@ -2176,17 +2176,7 @@
                 <a:latin typeface="Gill Sans"/>
                 <a:cs typeface="Gill Sans"/>
               </a:rPr>
-              <a:t>Thursday, October </a:t>
-            </a:r>
-            <a:r>
-              <a:rPr lang="en-US" sz="2400" b="0" kern="0" dirty="0" smtClean="0">
-                <a:solidFill>
-                  <a:schemeClr val="bg1"/>
-                </a:solidFill>
-                <a:latin typeface="Gill Sans"/>
-                <a:cs typeface="Gill Sans"/>
-              </a:rPr>
-              <a:t>3</a:t>
+              <a:t>Thursday, October 3</a:t>
             </a:r>
             <a:r>
               <a:rPr lang="en-US" sz="2400" b="0" kern="0" smtClean="0">
@@ -8878,8 +8868,13 @@
             <a:pPr lvl="1"/>
             <a:r>
               <a:rPr lang="en-US" dirty="0" smtClean="0"/>
-              <a:t>Takes in one or more parameters</a:t>
-            </a:r>
+              <a:t>Takes in one or more </a:t>
+            </a:r>
+            <a:r>
+              <a:rPr lang="en-US" dirty="0" smtClean="0"/>
+              <a:t>parameters (or arguments)</a:t>
+            </a:r>
+            <a:endParaRPr lang="en-US" dirty="0" smtClean="0"/>
           </a:p>
           <a:p>
             <a:pPr lvl="1"/>
@@ -10096,7 +10091,11 @@
             <a:pPr lvl="1"/>
             <a:r>
               <a:rPr lang="en-US" dirty="0" smtClean="0"/>
-              <a:t>Arguments to the function are specified between the </a:t>
+              <a:t>Parameters </a:t>
+            </a:r>
+            <a:r>
+              <a:rPr lang="en-US" dirty="0" smtClean="0"/>
+              <a:t>to the function are specified between the </a:t>
             </a:r>
             <a:r>
               <a:rPr lang="en-US" dirty="0" err="1" smtClean="0"/>

</xml_diff>